<commit_message>
updated correlation matrix find in the PPT
correlation matrix finding updated
</commit_message>
<xml_diff>
--- a/Presentations/CapstoneProject_Presentation.pptx
+++ b/Presentations/CapstoneProject_Presentation.pptx
@@ -9,10 +9,11 @@
     <p:sldId id="257" r:id="rId3"/>
     <p:sldId id="258" r:id="rId4"/>
     <p:sldId id="263" r:id="rId5"/>
-    <p:sldId id="264" r:id="rId6"/>
-    <p:sldId id="265" r:id="rId7"/>
-    <p:sldId id="266" r:id="rId8"/>
-    <p:sldId id="267" r:id="rId9"/>
+    <p:sldId id="268" r:id="rId6"/>
+    <p:sldId id="264" r:id="rId7"/>
+    <p:sldId id="265" r:id="rId8"/>
+    <p:sldId id="266" r:id="rId9"/>
+    <p:sldId id="267" r:id="rId10"/>
   </p:sldIdLst>
   <p:sldSz cx="12192000" cy="6858000"/>
   <p:notesSz cx="6858000" cy="9144000"/>
@@ -268,7 +269,7 @@
           <a:p>
             <a:fld id="{D1D1EADE-8E88-4C7C-8AC5-FB148DE4940E}" type="datetime1">
               <a:rPr lang="en-US" smtClean="0"/>
-              <a:t>11/11/2024</a:t>
+              <a:t>11/19/2024</a:t>
             </a:fld>
             <a:endParaRPr lang="en-US"/>
           </a:p>
@@ -468,7 +469,7 @@
           <a:p>
             <a:fld id="{EC3C8B9C-477D-492A-96AD-1FC2CC997A73}" type="datetime1">
               <a:rPr lang="en-US" smtClean="0"/>
-              <a:t>11/11/2024</a:t>
+              <a:t>11/19/2024</a:t>
             </a:fld>
             <a:endParaRPr lang="en-US"/>
           </a:p>
@@ -678,7 +679,7 @@
           <a:p>
             <a:fld id="{42D3AED5-E26D-4E29-B1B3-7847B6779594}" type="datetime1">
               <a:rPr lang="en-US" smtClean="0"/>
-              <a:t>11/11/2024</a:t>
+              <a:t>11/19/2024</a:t>
             </a:fld>
             <a:endParaRPr lang="en-US"/>
           </a:p>
@@ -878,7 +879,7 @@
           <a:p>
             <a:fld id="{157B6794-849E-4626-908B-D15793550EFB}" type="datetime1">
               <a:rPr lang="en-US" smtClean="0"/>
-              <a:t>11/11/2024</a:t>
+              <a:t>11/19/2024</a:t>
             </a:fld>
             <a:endParaRPr lang="en-US"/>
           </a:p>
@@ -1154,7 +1155,7 @@
           <a:p>
             <a:fld id="{63DB64E7-5594-42A3-ADBF-E95A7ACEAD64}" type="datetime1">
               <a:rPr lang="en-US" smtClean="0"/>
-              <a:t>11/11/2024</a:t>
+              <a:t>11/19/2024</a:t>
             </a:fld>
             <a:endParaRPr lang="en-US"/>
           </a:p>
@@ -1422,7 +1423,7 @@
           <a:p>
             <a:fld id="{18462B0B-D248-4FFB-8695-AD7FA4B1284A}" type="datetime1">
               <a:rPr lang="en-US" smtClean="0"/>
-              <a:t>11/11/2024</a:t>
+              <a:t>11/19/2024</a:t>
             </a:fld>
             <a:endParaRPr lang="en-US"/>
           </a:p>
@@ -1837,7 +1838,7 @@
           <a:p>
             <a:fld id="{D0378EFB-9159-4510-B73F-4F0409ADE937}" type="datetime1">
               <a:rPr lang="en-US" smtClean="0"/>
-              <a:t>11/11/2024</a:t>
+              <a:t>11/19/2024</a:t>
             </a:fld>
             <a:endParaRPr lang="en-US"/>
           </a:p>
@@ -1979,7 +1980,7 @@
           <a:p>
             <a:fld id="{89BC9412-2452-4BED-A324-9D8C115361AD}" type="datetime1">
               <a:rPr lang="en-US" smtClean="0"/>
-              <a:t>11/11/2024</a:t>
+              <a:t>11/19/2024</a:t>
             </a:fld>
             <a:endParaRPr lang="en-US"/>
           </a:p>
@@ -2092,7 +2093,7 @@
           <a:p>
             <a:fld id="{F5318F62-D251-40E8-A23C-F4CFE9FEAB41}" type="datetime1">
               <a:rPr lang="en-US" smtClean="0"/>
-              <a:t>11/11/2024</a:t>
+              <a:t>11/19/2024</a:t>
             </a:fld>
             <a:endParaRPr lang="en-US"/>
           </a:p>
@@ -2405,7 +2406,7 @@
           <a:p>
             <a:fld id="{44F76144-149E-4874-93A5-554A0357CF82}" type="datetime1">
               <a:rPr lang="en-US" smtClean="0"/>
-              <a:t>11/11/2024</a:t>
+              <a:t>11/19/2024</a:t>
             </a:fld>
             <a:endParaRPr lang="en-US"/>
           </a:p>
@@ -2694,7 +2695,7 @@
           <a:p>
             <a:fld id="{50BA65D8-0540-4835-AE5C-25D29DBA01BE}" type="datetime1">
               <a:rPr lang="en-US" smtClean="0"/>
-              <a:t>11/11/2024</a:t>
+              <a:t>11/19/2024</a:t>
             </a:fld>
             <a:endParaRPr lang="en-US"/>
           </a:p>
@@ -2937,7 +2938,7 @@
           <a:p>
             <a:fld id="{E31BA835-12AC-4E8F-955A-EA3F4DE2791F}" type="datetime1">
               <a:rPr lang="en-US" smtClean="0"/>
-              <a:t>11/11/2024</a:t>
+              <a:t>11/19/2024</a:t>
             </a:fld>
             <a:endParaRPr lang="en-US"/>
           </a:p>
@@ -3974,7 +3975,7 @@
           <p:cNvPr id="2" name="Title 1">
             <a:extLst>
               <a:ext uri="{FF2B5EF4-FFF2-40B4-BE49-F238E27FC236}">
-                <a16:creationId xmlns:a16="http://schemas.microsoft.com/office/drawing/2014/main" id="{2EF2F6CA-F061-7025-7C93-536BF8D0909F}"/>
+                <a16:creationId xmlns:a16="http://schemas.microsoft.com/office/drawing/2014/main" id="{36E3DADD-929A-7CD4-6415-EC8ADBCCF6FA}"/>
               </a:ext>
             </a:extLst>
           </p:cNvPr>
@@ -3991,8 +3992,8 @@
           <a:lstStyle/>
           <a:p>
             <a:r>
-              <a:rPr lang="en-IN" dirty="0"/>
-              <a:t>Developing the model</a:t>
+              <a:rPr lang="en-US" dirty="0"/>
+              <a:t>Correlation Matrix Analysis of Flooding Predictive Features</a:t>
             </a:r>
           </a:p>
         </p:txBody>
@@ -4002,7 +4003,7 @@
           <p:cNvPr id="3" name="Content Placeholder 2">
             <a:extLst>
               <a:ext uri="{FF2B5EF4-FFF2-40B4-BE49-F238E27FC236}">
-                <a16:creationId xmlns:a16="http://schemas.microsoft.com/office/drawing/2014/main" id="{8CE3DAD7-67C2-EEE7-9AE5-65D7525C32A6}"/>
+                <a16:creationId xmlns:a16="http://schemas.microsoft.com/office/drawing/2014/main" id="{ECD16592-2379-4D44-6E0D-0E1140907ED0}"/>
               </a:ext>
             </a:extLst>
           </p:cNvPr>
@@ -4018,14 +4019,171 @@
           <a:bodyPr/>
           <a:lstStyle/>
           <a:p>
-            <a:endParaRPr lang="en-IN" dirty="0"/>
+            <a:r>
+              <a:rPr lang="en-US" sz="1800" b="1" dirty="0"/>
+              <a:t>Objective: </a:t>
+            </a:r>
+            <a:r>
+              <a:rPr lang="en-US" sz="1800" dirty="0"/>
+              <a:t>To analyze the relationship between various factors affecting flood risk.</a:t>
+            </a:r>
+          </a:p>
+          <a:p>
+            <a:pPr algn="just"/>
+            <a:r>
+              <a:rPr lang="en-US" sz="1800" b="1" dirty="0"/>
+              <a:t>Key Features Analyzed: </a:t>
+            </a:r>
+            <a:r>
+              <a:rPr lang="en-US" sz="1800" dirty="0"/>
+              <a:t>Monsoon Intensity, Topography Drainage, River Management, Deforestation, Urbanization, Climate Change, Dams Quality, Siltation, Agricultural Practices, Encroachments, Ineffective Disaster Preparedness, Drainage Systems, Coastal Vulnerability, Landslides, Watersheds, Deteriorating Infrastructure, Population Density, Wetland Loss, Inadequate Planning, Political Factors.</a:t>
+            </a:r>
+          </a:p>
+          <a:p>
+            <a:r>
+              <a:rPr lang="en-US" sz="1800" b="1" dirty="0"/>
+              <a:t>Findings</a:t>
+            </a:r>
+          </a:p>
+          <a:p>
+            <a:pPr marL="0" indent="0">
+              <a:buNone/>
+            </a:pPr>
+            <a:endParaRPr lang="en-US" sz="1800" b="1" dirty="0"/>
+          </a:p>
+        </p:txBody>
+      </p:sp>
+      <p:pic>
+        <p:nvPicPr>
+          <p:cNvPr id="5" name="Picture 4">
+            <a:extLst>
+              <a:ext uri="{FF2B5EF4-FFF2-40B4-BE49-F238E27FC236}">
+                <a16:creationId xmlns:a16="http://schemas.microsoft.com/office/drawing/2014/main" id="{454B1525-E555-D789-5D6C-8ABDFFD405DB}"/>
+              </a:ext>
+            </a:extLst>
+          </p:cNvPr>
+          <p:cNvPicPr>
+            <a:picLocks noChangeAspect="1"/>
+          </p:cNvPicPr>
+          <p:nvPr/>
+        </p:nvPicPr>
+        <p:blipFill>
+          <a:blip r:embed="rId2">
+            <a:extLst>
+              <a:ext uri="{28A0092B-C50C-407E-A947-70E740481C1C}">
+                <a14:useLocalDpi xmlns:a14="http://schemas.microsoft.com/office/drawing/2010/main" val="0"/>
+              </a:ext>
+            </a:extLst>
+          </a:blip>
+          <a:stretch>
+            <a:fillRect/>
+          </a:stretch>
+        </p:blipFill>
+        <p:spPr>
+          <a:xfrm>
+            <a:off x="838200" y="3646356"/>
+            <a:ext cx="5864774" cy="2846519"/>
+          </a:xfrm>
+          <a:prstGeom prst="rect">
+            <a:avLst/>
+          </a:prstGeom>
+        </p:spPr>
+      </p:pic>
+      <p:sp>
+        <p:nvSpPr>
+          <p:cNvPr id="6" name="TextBox 5">
+            <a:extLst>
+              <a:ext uri="{FF2B5EF4-FFF2-40B4-BE49-F238E27FC236}">
+                <a16:creationId xmlns:a16="http://schemas.microsoft.com/office/drawing/2014/main" id="{9C77F60F-33E7-F302-5D79-94815AA315BD}"/>
+              </a:ext>
+            </a:extLst>
+          </p:cNvPr>
+          <p:cNvSpPr txBox="1"/>
+          <p:nvPr/>
+        </p:nvSpPr>
+        <p:spPr>
+          <a:xfrm>
+            <a:off x="5880538" y="3500175"/>
+            <a:ext cx="5473262" cy="2031325"/>
+          </a:xfrm>
+          <a:prstGeom prst="rect">
+            <a:avLst/>
+          </a:prstGeom>
+          <a:noFill/>
+        </p:spPr>
+        <p:txBody>
+          <a:bodyPr wrap="square" rtlCol="0">
+            <a:spAutoFit/>
+          </a:bodyPr>
+          <a:lstStyle/>
+          <a:p>
+            <a:pPr marL="285750" indent="-285750">
+              <a:buFont typeface="Arial" panose="020B0604020202020204" pitchFamily="34" charset="0"/>
+              <a:buChar char="•"/>
+            </a:pPr>
+            <a:r>
+              <a:rPr lang="en-US" dirty="0"/>
+              <a:t>The correlation between all the features and flooding probability is approximately </a:t>
+            </a:r>
+            <a:r>
+              <a:rPr lang="en-US" b="1" dirty="0"/>
+              <a:t>0.19</a:t>
+            </a:r>
+            <a:r>
+              <a:rPr lang="en-US" dirty="0"/>
+              <a:t>.</a:t>
+            </a:r>
+          </a:p>
+          <a:p>
+            <a:pPr marL="285750" indent="-285750">
+              <a:buFont typeface="Arial" panose="020B0604020202020204" pitchFamily="34" charset="0"/>
+              <a:buChar char="•"/>
+            </a:pPr>
+            <a:r>
+              <a:rPr lang="en-US" dirty="0"/>
+              <a:t>A </a:t>
+            </a:r>
+            <a:r>
+              <a:rPr lang="en-US" b="1" dirty="0"/>
+              <a:t>0.19 correlation</a:t>
+            </a:r>
+            <a:r>
+              <a:rPr lang="en-US" dirty="0"/>
+              <a:t> suggests </a:t>
+            </a:r>
+            <a:r>
+              <a:rPr lang="en-US" b="1" dirty="0"/>
+              <a:t>weak to moderate</a:t>
+            </a:r>
+            <a:r>
+              <a:rPr lang="en-US" dirty="0"/>
+              <a:t> association between the features and the flooding probability.</a:t>
+            </a:r>
+          </a:p>
+          <a:p>
+            <a:pPr marL="285750" indent="-285750">
+              <a:buFont typeface="Arial" panose="020B0604020202020204" pitchFamily="34" charset="0"/>
+              <a:buChar char="•"/>
+            </a:pPr>
+            <a:r>
+              <a:rPr lang="en-US" dirty="0"/>
+              <a:t>The correlation matrix results indicate </a:t>
+            </a:r>
+            <a:r>
+              <a:rPr lang="en-US" b="1" dirty="0"/>
+              <a:t>complexity in flood prediction</a:t>
+            </a:r>
+            <a:r>
+              <a:rPr lang="en-US" dirty="0"/>
+              <a:t>. </a:t>
+            </a:r>
           </a:p>
         </p:txBody>
       </p:sp>
     </p:spTree>
     <p:extLst>
       <p:ext uri="{BB962C8B-B14F-4D97-AF65-F5344CB8AC3E}">
-        <p14:creationId xmlns:p14="http://schemas.microsoft.com/office/powerpoint/2010/main" val="3050353189"/>
+        <p14:creationId xmlns:p14="http://schemas.microsoft.com/office/powerpoint/2010/main" val="2237096293"/>
       </p:ext>
     </p:extLst>
   </p:cSld>
@@ -4057,7 +4215,7 @@
           <p:cNvPr id="2" name="Title 1">
             <a:extLst>
               <a:ext uri="{FF2B5EF4-FFF2-40B4-BE49-F238E27FC236}">
-                <a16:creationId xmlns:a16="http://schemas.microsoft.com/office/drawing/2014/main" id="{1FECF152-166E-729D-4725-E1E0DBC6EE5E}"/>
+                <a16:creationId xmlns:a16="http://schemas.microsoft.com/office/drawing/2014/main" id="{2EF2F6CA-F061-7025-7C93-536BF8D0909F}"/>
               </a:ext>
             </a:extLst>
           </p:cNvPr>
@@ -4075,7 +4233,7 @@
           <a:p>
             <a:r>
               <a:rPr lang="en-IN" dirty="0"/>
-              <a:t>Hyperparameter tuning.</a:t>
+              <a:t>Developing the model</a:t>
             </a:r>
           </a:p>
         </p:txBody>
@@ -4085,7 +4243,7 @@
           <p:cNvPr id="3" name="Content Placeholder 2">
             <a:extLst>
               <a:ext uri="{FF2B5EF4-FFF2-40B4-BE49-F238E27FC236}">
-                <a16:creationId xmlns:a16="http://schemas.microsoft.com/office/drawing/2014/main" id="{5031A1EE-4ACB-8F91-ABAF-A4156A23FFE7}"/>
+                <a16:creationId xmlns:a16="http://schemas.microsoft.com/office/drawing/2014/main" id="{8CE3DAD7-67C2-EEE7-9AE5-65D7525C32A6}"/>
               </a:ext>
             </a:extLst>
           </p:cNvPr>
@@ -4108,7 +4266,7 @@
     </p:spTree>
     <p:extLst>
       <p:ext uri="{BB962C8B-B14F-4D97-AF65-F5344CB8AC3E}">
-        <p14:creationId xmlns:p14="http://schemas.microsoft.com/office/powerpoint/2010/main" val="236038486"/>
+        <p14:creationId xmlns:p14="http://schemas.microsoft.com/office/powerpoint/2010/main" val="3050353189"/>
       </p:ext>
     </p:extLst>
   </p:cSld>
@@ -4140,6 +4298,89 @@
           <p:cNvPr id="2" name="Title 1">
             <a:extLst>
               <a:ext uri="{FF2B5EF4-FFF2-40B4-BE49-F238E27FC236}">
+                <a16:creationId xmlns:a16="http://schemas.microsoft.com/office/drawing/2014/main" id="{1FECF152-166E-729D-4725-E1E0DBC6EE5E}"/>
+              </a:ext>
+            </a:extLst>
+          </p:cNvPr>
+          <p:cNvSpPr>
+            <a:spLocks noGrp="1"/>
+          </p:cNvSpPr>
+          <p:nvPr>
+            <p:ph type="title"/>
+          </p:nvPr>
+        </p:nvSpPr>
+        <p:spPr/>
+        <p:txBody>
+          <a:bodyPr/>
+          <a:lstStyle/>
+          <a:p>
+            <a:r>
+              <a:rPr lang="en-IN" dirty="0"/>
+              <a:t>Hyperparameter tuning.</a:t>
+            </a:r>
+          </a:p>
+        </p:txBody>
+      </p:sp>
+      <p:sp>
+        <p:nvSpPr>
+          <p:cNvPr id="3" name="Content Placeholder 2">
+            <a:extLst>
+              <a:ext uri="{FF2B5EF4-FFF2-40B4-BE49-F238E27FC236}">
+                <a16:creationId xmlns:a16="http://schemas.microsoft.com/office/drawing/2014/main" id="{5031A1EE-4ACB-8F91-ABAF-A4156A23FFE7}"/>
+              </a:ext>
+            </a:extLst>
+          </p:cNvPr>
+          <p:cNvSpPr>
+            <a:spLocks noGrp="1"/>
+          </p:cNvSpPr>
+          <p:nvPr>
+            <p:ph idx="1"/>
+          </p:nvPr>
+        </p:nvSpPr>
+        <p:spPr/>
+        <p:txBody>
+          <a:bodyPr/>
+          <a:lstStyle/>
+          <a:p>
+            <a:endParaRPr lang="en-IN" dirty="0"/>
+          </a:p>
+        </p:txBody>
+      </p:sp>
+    </p:spTree>
+    <p:extLst>
+      <p:ext uri="{BB962C8B-B14F-4D97-AF65-F5344CB8AC3E}">
+        <p14:creationId xmlns:p14="http://schemas.microsoft.com/office/powerpoint/2010/main" val="236038486"/>
+      </p:ext>
+    </p:extLst>
+  </p:cSld>
+  <p:clrMapOvr>
+    <a:masterClrMapping/>
+  </p:clrMapOvr>
+</p:sld>
+</file>
+
+<file path=ppt/slides/slide8.xml><?xml version="1.0" encoding="utf-8"?>
+<p:sld xmlns:a="http://schemas.openxmlformats.org/drawingml/2006/main" xmlns:r="http://schemas.openxmlformats.org/officeDocument/2006/relationships" xmlns:p="http://schemas.openxmlformats.org/presentationml/2006/main">
+  <p:cSld>
+    <p:spTree>
+      <p:nvGrpSpPr>
+        <p:cNvPr id="1" name=""/>
+        <p:cNvGrpSpPr/>
+        <p:nvPr/>
+      </p:nvGrpSpPr>
+      <p:grpSpPr>
+        <a:xfrm>
+          <a:off x="0" y="0"/>
+          <a:ext cx="0" cy="0"/>
+          <a:chOff x="0" y="0"/>
+          <a:chExt cx="0" cy="0"/>
+        </a:xfrm>
+      </p:grpSpPr>
+      <p:sp>
+        <p:nvSpPr>
+          <p:cNvPr id="2" name="Title 1">
+            <a:extLst>
+              <a:ext uri="{FF2B5EF4-FFF2-40B4-BE49-F238E27FC236}">
                 <a16:creationId xmlns:a16="http://schemas.microsoft.com/office/drawing/2014/main" id="{412939C4-F5DB-B582-A957-739905D4D127}"/>
               </a:ext>
             </a:extLst>
@@ -4201,7 +4442,7 @@
 </p:sld>
 </file>
 
-<file path=ppt/slides/slide8.xml><?xml version="1.0" encoding="utf-8"?>
+<file path=ppt/slides/slide9.xml><?xml version="1.0" encoding="utf-8"?>
 <p:sld xmlns:a="http://schemas.openxmlformats.org/drawingml/2006/main" xmlns:r="http://schemas.openxmlformats.org/officeDocument/2006/relationships" xmlns:p="http://schemas.openxmlformats.org/presentationml/2006/main">
   <p:cSld>
     <p:spTree>

</xml_diff>